<commit_message>
Add sequence diagram for history.
</commit_message>
<xml_diff>
--- a/docs/diagrams/AutocompleteSuggestActivityDiagram1.pptx
+++ b/docs/diagrams/AutocompleteSuggestActivityDiagram1.pptx
@@ -261,7 +261,7 @@
           <a:p>
             <a:fld id="{542F47FF-5056-41FF-A1F8-23A414798AA4}" type="datetimeFigureOut">
               <a:rPr lang="en-SG" smtClean="0"/>
-              <a:t>17/10/2018</a:t>
+              <a:t>12/11/2018</a:t>
             </a:fld>
             <a:endParaRPr lang="en-SG"/>
           </a:p>
@@ -461,7 +461,7 @@
           <a:p>
             <a:fld id="{542F47FF-5056-41FF-A1F8-23A414798AA4}" type="datetimeFigureOut">
               <a:rPr lang="en-SG" smtClean="0"/>
-              <a:t>17/10/2018</a:t>
+              <a:t>12/11/2018</a:t>
             </a:fld>
             <a:endParaRPr lang="en-SG"/>
           </a:p>
@@ -671,7 +671,7 @@
           <a:p>
             <a:fld id="{542F47FF-5056-41FF-A1F8-23A414798AA4}" type="datetimeFigureOut">
               <a:rPr lang="en-SG" smtClean="0"/>
-              <a:t>17/10/2018</a:t>
+              <a:t>12/11/2018</a:t>
             </a:fld>
             <a:endParaRPr lang="en-SG"/>
           </a:p>
@@ -871,7 +871,7 @@
           <a:p>
             <a:fld id="{542F47FF-5056-41FF-A1F8-23A414798AA4}" type="datetimeFigureOut">
               <a:rPr lang="en-SG" smtClean="0"/>
-              <a:t>17/10/2018</a:t>
+              <a:t>12/11/2018</a:t>
             </a:fld>
             <a:endParaRPr lang="en-SG"/>
           </a:p>
@@ -1147,7 +1147,7 @@
           <a:p>
             <a:fld id="{542F47FF-5056-41FF-A1F8-23A414798AA4}" type="datetimeFigureOut">
               <a:rPr lang="en-SG" smtClean="0"/>
-              <a:t>17/10/2018</a:t>
+              <a:t>12/11/2018</a:t>
             </a:fld>
             <a:endParaRPr lang="en-SG"/>
           </a:p>
@@ -1415,7 +1415,7 @@
           <a:p>
             <a:fld id="{542F47FF-5056-41FF-A1F8-23A414798AA4}" type="datetimeFigureOut">
               <a:rPr lang="en-SG" smtClean="0"/>
-              <a:t>17/10/2018</a:t>
+              <a:t>12/11/2018</a:t>
             </a:fld>
             <a:endParaRPr lang="en-SG"/>
           </a:p>
@@ -1830,7 +1830,7 @@
           <a:p>
             <a:fld id="{542F47FF-5056-41FF-A1F8-23A414798AA4}" type="datetimeFigureOut">
               <a:rPr lang="en-SG" smtClean="0"/>
-              <a:t>17/10/2018</a:t>
+              <a:t>12/11/2018</a:t>
             </a:fld>
             <a:endParaRPr lang="en-SG"/>
           </a:p>
@@ -1972,7 +1972,7 @@
           <a:p>
             <a:fld id="{542F47FF-5056-41FF-A1F8-23A414798AA4}" type="datetimeFigureOut">
               <a:rPr lang="en-SG" smtClean="0"/>
-              <a:t>17/10/2018</a:t>
+              <a:t>12/11/2018</a:t>
             </a:fld>
             <a:endParaRPr lang="en-SG"/>
           </a:p>
@@ -2085,7 +2085,7 @@
           <a:p>
             <a:fld id="{542F47FF-5056-41FF-A1F8-23A414798AA4}" type="datetimeFigureOut">
               <a:rPr lang="en-SG" smtClean="0"/>
-              <a:t>17/10/2018</a:t>
+              <a:t>12/11/2018</a:t>
             </a:fld>
             <a:endParaRPr lang="en-SG"/>
           </a:p>
@@ -2398,7 +2398,7 @@
           <a:p>
             <a:fld id="{542F47FF-5056-41FF-A1F8-23A414798AA4}" type="datetimeFigureOut">
               <a:rPr lang="en-SG" smtClean="0"/>
-              <a:t>17/10/2018</a:t>
+              <a:t>12/11/2018</a:t>
             </a:fld>
             <a:endParaRPr lang="en-SG"/>
           </a:p>
@@ -2687,7 +2687,7 @@
           <a:p>
             <a:fld id="{542F47FF-5056-41FF-A1F8-23A414798AA4}" type="datetimeFigureOut">
               <a:rPr lang="en-SG" smtClean="0"/>
-              <a:t>17/10/2018</a:t>
+              <a:t>12/11/2018</a:t>
             </a:fld>
             <a:endParaRPr lang="en-SG"/>
           </a:p>
@@ -2930,7 +2930,7 @@
           <a:p>
             <a:fld id="{542F47FF-5056-41FF-A1F8-23A414798AA4}" type="datetimeFigureOut">
               <a:rPr lang="en-SG" smtClean="0"/>
-              <a:t>17/10/2018</a:t>
+              <a:t>12/11/2018</a:t>
             </a:fld>
             <a:endParaRPr lang="en-SG"/>
           </a:p>
@@ -4047,11 +4047,11 @@
             <a:pPr algn="ctr"/>
             <a:r>
               <a:rPr lang="en-SG" sz="1801" dirty="0"/>
-              <a:t>New </a:t>
+              <a:t>Parse by </a:t>
             </a:r>
             <a:r>
               <a:rPr lang="en-SG" sz="1801" dirty="0" err="1"/>
-              <a:t>SuggestCommand</a:t>
+              <a:t>SuggestCommandParser</a:t>
             </a:r>
             <a:endParaRPr lang="en-SG" sz="1801" dirty="0"/>
           </a:p>

</xml_diff>